<commit_message>
add pdf for printing
</commit_message>
<xml_diff>
--- a/presentation/Poster_Template.pptx
+++ b/presentation/Poster_Template.pptx
@@ -4199,7 +4199,7 @@
             <a:r>
               <a:rPr lang="en-US" dirty="0">
                 <a:solidFill>
-                  <a:srgbClr val="00B050"/>
+                  <a:srgbClr val="0070C0"/>
                 </a:solidFill>
               </a:rPr>
               <a:t>Our Solution:</a:t>
@@ -4213,7 +4213,7 @@
             <a:r>
               <a:rPr lang="en-US" dirty="0">
                 <a:solidFill>
-                  <a:srgbClr val="00B050"/>
+                  <a:srgbClr val="0070C0"/>
                 </a:solidFill>
               </a:rPr>
               <a:t>Stealthy logging mechanism, called </a:t>
@@ -4221,7 +4221,7 @@
             <a:r>
               <a:rPr lang="en-US" dirty="0" err="1">
                 <a:solidFill>
-                  <a:srgbClr val="00B050"/>
+                  <a:srgbClr val="0070C0"/>
                 </a:solidFill>
               </a:rPr>
               <a:t>SnapShotter</a:t>
@@ -4229,7 +4229,7 @@
             <a:r>
               <a:rPr lang="en-US" dirty="0">
                 <a:solidFill>
-                  <a:srgbClr val="00B050"/>
+                  <a:srgbClr val="0070C0"/>
                 </a:solidFill>
               </a:rPr>
               <a:t> Agent.</a:t>

</xml_diff>